<commit_message>
updated report and added animated chart
</commit_message>
<xml_diff>
--- a/ETL Project - Draft report.pptx
+++ b/ETL Project - Draft report.pptx
@@ -134,6 +134,18 @@
     </p:ext>
   </p:extLst>
 </p:presentation>
+</file>
+
+<file path=ppt/commentAuthors.xml><?xml version="1.0" encoding="utf-8"?>
+<p:cmAuthorLst xmlns:a="http://schemas.openxmlformats.org/drawingml/2006/main" xmlns:r="http://schemas.openxmlformats.org/officeDocument/2006/relationships" xmlns:p="http://schemas.openxmlformats.org/presentationml/2006/main">
+  <p:cmAuthor id="1" name="Nada Ibrahim" initials="NI" lastIdx="1" clrIdx="0">
+    <p:extLst>
+      <p:ext uri="{19B8F6BF-5375-455C-9EA6-DF929625EA0E}">
+        <p15:presenceInfo xmlns:p15="http://schemas.microsoft.com/office/powerpoint/2012/main" userId="Nada Ibrahim" providerId="None"/>
+      </p:ext>
+    </p:extLst>
+  </p:cmAuthor>
+</p:cmAuthorLst>
 </file>
 
 <file path=ppt/diagrams/colors1.xml><?xml version="1.0" encoding="utf-8"?>
@@ -14055,7 +14067,7 @@
           <a:p>
             <a:fld id="{02AC24A9-CCB6-4F8D-B8DB-C2F3692CFA5A}" type="datetimeFigureOut">
               <a:rPr lang="en-US" smtClean="0"/>
-              <a:t>4/27/2020</a:t>
+              <a:t>4/28/2020</a:t>
             </a:fld>
             <a:endParaRPr lang="en-US" dirty="0"/>
           </a:p>
@@ -14425,7 +14437,7 @@
           <a:p>
             <a:fld id="{02AC24A9-CCB6-4F8D-B8DB-C2F3692CFA5A}" type="datetimeFigureOut">
               <a:rPr lang="en-US" smtClean="0"/>
-              <a:t>4/27/2020</a:t>
+              <a:t>4/28/2020</a:t>
             </a:fld>
             <a:endParaRPr lang="en-US"/>
           </a:p>
@@ -14634,7 +14646,7 @@
           <a:p>
             <a:fld id="{02AC24A9-CCB6-4F8D-B8DB-C2F3692CFA5A}" type="datetimeFigureOut">
               <a:rPr lang="en-US" smtClean="0"/>
-              <a:t>4/27/2020</a:t>
+              <a:t>4/28/2020</a:t>
             </a:fld>
             <a:endParaRPr lang="en-US"/>
           </a:p>
@@ -15104,7 +15116,7 @@
           <a:p>
             <a:fld id="{02AC24A9-CCB6-4F8D-B8DB-C2F3692CFA5A}" type="datetimeFigureOut">
               <a:rPr lang="en-US" smtClean="0"/>
-              <a:t>4/27/2020</a:t>
+              <a:t>4/28/2020</a:t>
             </a:fld>
             <a:endParaRPr lang="en-US"/>
           </a:p>
@@ -15558,7 +15570,7 @@
           <a:p>
             <a:fld id="{02AC24A9-CCB6-4F8D-B8DB-C2F3692CFA5A}" type="datetimeFigureOut">
               <a:rPr lang="en-US" smtClean="0"/>
-              <a:t>4/27/2020</a:t>
+              <a:t>4/28/2020</a:t>
             </a:fld>
             <a:endParaRPr lang="en-US"/>
           </a:p>
@@ -16090,7 +16102,7 @@
           <a:p>
             <a:fld id="{02AC24A9-CCB6-4F8D-B8DB-C2F3692CFA5A}" type="datetimeFigureOut">
               <a:rPr lang="en-US" smtClean="0"/>
-              <a:t>4/27/2020</a:t>
+              <a:t>4/28/2020</a:t>
             </a:fld>
             <a:endParaRPr lang="en-US"/>
           </a:p>
@@ -16789,7 +16801,7 @@
           <a:p>
             <a:fld id="{02AC24A9-CCB6-4F8D-B8DB-C2F3692CFA5A}" type="datetimeFigureOut">
               <a:rPr lang="en-US" smtClean="0"/>
-              <a:t>4/27/2020</a:t>
+              <a:t>4/28/2020</a:t>
             </a:fld>
             <a:endParaRPr lang="en-US"/>
           </a:p>
@@ -17118,7 +17130,7 @@
           <a:p>
             <a:fld id="{02AC24A9-CCB6-4F8D-B8DB-C2F3692CFA5A}" type="datetimeFigureOut">
               <a:rPr lang="en-US" smtClean="0"/>
-              <a:t>4/27/2020</a:t>
+              <a:t>4/28/2020</a:t>
             </a:fld>
             <a:endParaRPr lang="en-US"/>
           </a:p>
@@ -17231,7 +17243,7 @@
           <a:p>
             <a:fld id="{02AC24A9-CCB6-4F8D-B8DB-C2F3692CFA5A}" type="datetimeFigureOut">
               <a:rPr lang="en-US" smtClean="0"/>
-              <a:t>4/27/2020</a:t>
+              <a:t>4/28/2020</a:t>
             </a:fld>
             <a:endParaRPr lang="en-US"/>
           </a:p>
@@ -17726,7 +17738,7 @@
           <a:p>
             <a:fld id="{02AC24A9-CCB6-4F8D-B8DB-C2F3692CFA5A}" type="datetimeFigureOut">
               <a:rPr lang="en-US" smtClean="0"/>
-              <a:t>4/27/2020</a:t>
+              <a:t>4/28/2020</a:t>
             </a:fld>
             <a:endParaRPr lang="en-US" dirty="0"/>
           </a:p>
@@ -18203,7 +18215,7 @@
           <a:p>
             <a:fld id="{02AC24A9-CCB6-4F8D-B8DB-C2F3692CFA5A}" type="datetimeFigureOut">
               <a:rPr lang="en-US" smtClean="0"/>
-              <a:t>4/27/2020</a:t>
+              <a:t>4/28/2020</a:t>
             </a:fld>
             <a:endParaRPr lang="en-US"/>
           </a:p>
@@ -18446,7 +18458,7 @@
           <a:p>
             <a:fld id="{02AC24A9-CCB6-4F8D-B8DB-C2F3692CFA5A}" type="datetimeFigureOut">
               <a:rPr lang="en-US" smtClean="0"/>
-              <a:t>4/27/2020</a:t>
+              <a:t>4/28/2020</a:t>
             </a:fld>
             <a:endParaRPr lang="en-US"/>
           </a:p>
@@ -19213,59 +19225,102 @@
       </p:grpSpPr>
       <p:sp>
         <p:nvSpPr>
-          <p:cNvPr id="2" name="Title 1">
+          <p:cNvPr id="8" name="Title 1">
             <a:extLst>
               <a:ext uri="{FF2B5EF4-FFF2-40B4-BE49-F238E27FC236}">
-                <a16:creationId xmlns:a16="http://schemas.microsoft.com/office/drawing/2014/main" id="{E59645AC-C5A5-45BB-ADC2-640C656845FE}"/>
+                <a16:creationId xmlns:a16="http://schemas.microsoft.com/office/drawing/2014/main" id="{FB98A159-87A9-4CBC-860E-535B5A6B44BF}"/>
               </a:ext>
             </a:extLst>
           </p:cNvPr>
-          <p:cNvSpPr>
-            <a:spLocks noGrp="1"/>
+          <p:cNvSpPr txBox="1">
+            <a:spLocks/>
           </p:cNvSpPr>
-          <p:nvPr>
-            <p:ph type="title"/>
-          </p:nvPr>
+          <p:nvPr/>
         </p:nvSpPr>
-        <p:spPr/>
+        <p:spPr>
+          <a:xfrm>
+            <a:off x="1115568" y="548640"/>
+            <a:ext cx="10168128" cy="1179576"/>
+          </a:xfrm>
+          <a:prstGeom prst="rect">
+            <a:avLst/>
+          </a:prstGeom>
+        </p:spPr>
         <p:txBody>
           <a:bodyPr>
             <a:normAutofit/>
           </a:bodyPr>
-          <a:lstStyle/>
+          <a:lstStyle>
+            <a:lvl1pPr algn="l" defTabSz="914377" rtl="0" eaLnBrk="1" latinLnBrk="0" hangingPunct="1">
+              <a:lnSpc>
+                <a:spcPct val="90000"/>
+              </a:lnSpc>
+              <a:spcBef>
+                <a:spcPct val="0"/>
+              </a:spcBef>
+              <a:buNone/>
+              <a:defRPr sz="4400" kern="1200">
+                <a:solidFill>
+                  <a:schemeClr val="tx1"/>
+                </a:solidFill>
+                <a:latin typeface="+mj-lt"/>
+                <a:ea typeface="+mj-ea"/>
+                <a:cs typeface="+mj-cs"/>
+              </a:defRPr>
+            </a:lvl1pPr>
+          </a:lstStyle>
           <a:p>
             <a:r>
               <a:rPr lang="en-US" dirty="0"/>
-              <a:t>Analysis and findings</a:t>
+              <a:t>Analysis and  findings</a:t>
             </a:r>
           </a:p>
         </p:txBody>
       </p:sp>
-      <p:sp>
-        <p:nvSpPr>
-          <p:cNvPr id="3" name="Content Placeholder 2">
+      <p:pic>
+        <p:nvPicPr>
+          <p:cNvPr id="2" name="animated bar chart">
+            <a:hlinkClick r:id="" action="ppaction://media"/>
             <a:extLst>
               <a:ext uri="{FF2B5EF4-FFF2-40B4-BE49-F238E27FC236}">
-                <a16:creationId xmlns:a16="http://schemas.microsoft.com/office/drawing/2014/main" id="{B2A1A1AA-B7AE-4E6E-B4F4-2F24C9C444EF}"/>
+                <a16:creationId xmlns:a16="http://schemas.microsoft.com/office/drawing/2014/main" id="{10777A5C-24CB-4917-995C-531B061F2C8F}"/>
               </a:ext>
             </a:extLst>
           </p:cNvPr>
-          <p:cNvSpPr>
-            <a:spLocks noGrp="1"/>
-          </p:cNvSpPr>
+          <p:cNvPicPr>
+            <a:picLocks noChangeAspect="1"/>
+          </p:cNvPicPr>
           <p:nvPr>
-            <p:ph idx="1"/>
+            <a:videoFile r:link="rId2"/>
+            <p:extLst>
+              <p:ext uri="{DAA4B4D4-6D71-4841-9C94-3DE7FCFB9230}">
+                <p14:media xmlns:p14="http://schemas.microsoft.com/office/powerpoint/2010/main" r:embed="rId1"/>
+              </p:ext>
+            </p:extLst>
           </p:nvPr>
-        </p:nvSpPr>
-        <p:spPr/>
-        <p:txBody>
-          <a:bodyPr/>
-          <a:lstStyle/>
-          <a:p>
-            <a:endParaRPr lang="en-US"/>
-          </a:p>
-        </p:txBody>
-      </p:sp>
+        </p:nvPicPr>
+        <p:blipFill>
+          <a:blip r:embed="rId4"/>
+          <a:stretch>
+            <a:fillRect/>
+          </a:stretch>
+        </p:blipFill>
+        <p:spPr>
+          <a:xfrm>
+            <a:off x="1344394" y="1293212"/>
+            <a:ext cx="9710476" cy="5461045"/>
+          </a:xfrm>
+          <a:prstGeom prst="rect">
+            <a:avLst/>
+          </a:prstGeom>
+          <a:ln>
+            <a:noFill/>
+          </a:ln>
+          <a:effectLst>
+            <a:softEdge rad="112500"/>
+          </a:effectLst>
+        </p:spPr>
+      </p:pic>
     </p:spTree>
     <p:extLst>
       <p:ext uri="{BB962C8B-B14F-4D97-AF65-F5344CB8AC3E}">
@@ -19276,6 +19331,141 @@
   <p:clrMapOvr>
     <a:masterClrMapping/>
   </p:clrMapOvr>
+  <p:timing>
+    <p:tnLst>
+      <p:par>
+        <p:cTn id="1" dur="indefinite" restart="never" nodeType="tmRoot">
+          <p:childTnLst>
+            <p:seq concurrent="1" nextAc="seek">
+              <p:cTn id="2" dur="indefinite" nodeType="mainSeq">
+                <p:childTnLst>
+                  <p:par>
+                    <p:cTn id="3" fill="hold">
+                      <p:stCondLst>
+                        <p:cond delay="indefinite"/>
+                      </p:stCondLst>
+                      <p:childTnLst>
+                        <p:par>
+                          <p:cTn id="4" fill="hold">
+                            <p:stCondLst>
+                              <p:cond delay="0"/>
+                            </p:stCondLst>
+                            <p:childTnLst>
+                              <p:par>
+                                <p:cTn id="5" presetID="1" presetClass="mediacall" presetSubtype="0" fill="hold" nodeType="clickEffect">
+                                  <p:stCondLst>
+                                    <p:cond delay="0"/>
+                                  </p:stCondLst>
+                                  <p:childTnLst>
+                                    <p:cmd type="call" cmd="playFrom(0.0)">
+                                      <p:cBhvr>
+                                        <p:cTn id="6" dur="45500" fill="hold"/>
+                                        <p:tgtEl>
+                                          <p:spTgt spid="2"/>
+                                        </p:tgtEl>
+                                      </p:cBhvr>
+                                    </p:cmd>
+                                  </p:childTnLst>
+                                </p:cTn>
+                              </p:par>
+                            </p:childTnLst>
+                          </p:cTn>
+                        </p:par>
+                      </p:childTnLst>
+                    </p:cTn>
+                  </p:par>
+                </p:childTnLst>
+              </p:cTn>
+              <p:prevCondLst>
+                <p:cond evt="onPrev" delay="0">
+                  <p:tgtEl>
+                    <p:sldTgt/>
+                  </p:tgtEl>
+                </p:cond>
+              </p:prevCondLst>
+              <p:nextCondLst>
+                <p:cond evt="onNext" delay="0">
+                  <p:tgtEl>
+                    <p:sldTgt/>
+                  </p:tgtEl>
+                </p:cond>
+              </p:nextCondLst>
+            </p:seq>
+            <p:video>
+              <p:cMediaNode vol="80000">
+                <p:cTn id="7" fill="hold" display="0">
+                  <p:stCondLst>
+                    <p:cond delay="indefinite"/>
+                  </p:stCondLst>
+                </p:cTn>
+                <p:tgtEl>
+                  <p:spTgt spid="2"/>
+                </p:tgtEl>
+              </p:cMediaNode>
+            </p:video>
+            <p:seq concurrent="1" nextAc="seek">
+              <p:cTn id="8" restart="whenNotActive" fill="hold" evtFilter="cancelBubble" nodeType="interactiveSeq">
+                <p:stCondLst>
+                  <p:cond evt="onClick" delay="0">
+                    <p:tgtEl>
+                      <p:spTgt spid="2"/>
+                    </p:tgtEl>
+                  </p:cond>
+                </p:stCondLst>
+                <p:endSync evt="end" delay="0">
+                  <p:rtn val="all"/>
+                </p:endSync>
+                <p:childTnLst>
+                  <p:par>
+                    <p:cTn id="9" fill="hold">
+                      <p:stCondLst>
+                        <p:cond delay="0"/>
+                      </p:stCondLst>
+                      <p:childTnLst>
+                        <p:par>
+                          <p:cTn id="10" fill="hold">
+                            <p:stCondLst>
+                              <p:cond delay="0"/>
+                            </p:stCondLst>
+                            <p:childTnLst>
+                              <p:par>
+                                <p:cTn id="11" presetID="2" presetClass="mediacall" presetSubtype="0" fill="hold" nodeType="clickEffect">
+                                  <p:stCondLst>
+                                    <p:cond delay="0"/>
+                                  </p:stCondLst>
+                                  <p:childTnLst>
+                                    <p:cmd type="call" cmd="togglePause">
+                                      <p:cBhvr>
+                                        <p:cTn id="12" dur="1" fill="hold"/>
+                                        <p:tgtEl>
+                                          <p:spTgt spid="2"/>
+                                        </p:tgtEl>
+                                      </p:cBhvr>
+                                    </p:cmd>
+                                  </p:childTnLst>
+                                </p:cTn>
+                              </p:par>
+                            </p:childTnLst>
+                          </p:cTn>
+                        </p:par>
+                      </p:childTnLst>
+                    </p:cTn>
+                  </p:par>
+                </p:childTnLst>
+              </p:cTn>
+              <p:nextCondLst>
+                <p:cond evt="onClick" delay="0">
+                  <p:tgtEl>
+                    <p:spTgt spid="2"/>
+                  </p:tgtEl>
+                </p:cond>
+              </p:nextCondLst>
+            </p:seq>
+          </p:childTnLst>
+        </p:cTn>
+      </p:par>
+    </p:tnLst>
+  </p:timing>
 </p:sld>
 </file>
 

</xml_diff>